<commit_message>
mathematics for computer and science
</commit_message>
<xml_diff>
--- a/_site/assets/downloads/pre.pptx
+++ b/_site/assets/downloads/pre.pptx
@@ -9919,36 +9919,6 @@
           </a:p>
         </p:txBody>
       </p:sp>
-      <p:pic>
-        <p:nvPicPr>
-          <p:cNvPr id="4" name="图片 3">
-            <a:extLst>
-              <a:ext uri="{FF2B5EF4-FFF2-40B4-BE49-F238E27FC236}">
-                <a16:creationId xmlns:a16="http://schemas.microsoft.com/office/drawing/2014/main" id="{6AB25862-6FD5-9748-85E6-44D92970A654}"/>
-              </a:ext>
-            </a:extLst>
-          </p:cNvPr>
-          <p:cNvPicPr>
-            <a:picLocks noChangeAspect="1"/>
-          </p:cNvPicPr>
-          <p:nvPr/>
-        </p:nvPicPr>
-        <p:blipFill>
-          <a:blip r:embed="rId2"/>
-          <a:stretch>
-            <a:fillRect/>
-          </a:stretch>
-        </p:blipFill>
-        <p:spPr>
-          <a:xfrm>
-            <a:off x="2617438" y="786725"/>
-            <a:ext cx="6185862" cy="4791539"/>
-          </a:xfrm>
-          <a:prstGeom prst="rect">
-            <a:avLst/>
-          </a:prstGeom>
-        </p:spPr>
-      </p:pic>
       <mc:AlternateContent xmlns:mc="http://schemas.openxmlformats.org/markup-compatibility/2006">
         <mc:Choice xmlns:a14="http://schemas.microsoft.com/office/drawing/2010/main" Requires="a14">
           <p:sp>
@@ -9966,7 +9936,7 @@
             <p:spPr>
               <a:xfrm>
                 <a:off x="5085133" y="5725021"/>
-                <a:ext cx="1634294" cy="527580"/>
+                <a:ext cx="1637692" cy="454420"/>
               </a:xfrm>
               <a:prstGeom prst="rect">
                 <a:avLst/>
@@ -9984,126 +9954,92 @@
                       <m:jc m:val="centerGroup"/>
                     </m:oMathParaPr>
                     <m:oMath xmlns:m="http://schemas.openxmlformats.org/officeDocument/2006/math">
-                      <m:m>
-                        <m:mPr>
-                          <m:plcHide m:val="on"/>
-                          <m:mcs>
-                            <m:mc>
-                              <m:mcPr>
-                                <m:count m:val="1"/>
-                                <m:mcJc m:val="center"/>
-                              </m:mcPr>
-                            </m:mc>
-                          </m:mcs>
+                      <m:limUpp>
+                        <m:limUppPr>
                           <m:ctrlPr>
+                            <a:rPr lang="zh-CN" altLang="en-US" i="1">
+                              <a:latin typeface="Cambria Math" panose="02040503050406030204" pitchFamily="18" charset="0"/>
+                            </a:rPr>
+                          </m:ctrlPr>
+                        </m:limUppPr>
+                        <m:e>
+                          <m:r>
+                            <a:rPr lang="zh-CN" altLang="en-US" i="1">
+                              <a:latin typeface="Cambria Math" panose="02040503050406030204" pitchFamily="18" charset="0"/>
+                            </a:rPr>
+                            <m:t>𝑥</m:t>
+                          </m:r>
+                        </m:e>
+                        <m:lim>
+                          <m:r>
                             <a:rPr lang="zh-CN" altLang="en-US">
                               <a:latin typeface="Cambria Math" panose="02040503050406030204" pitchFamily="18" charset="0"/>
                             </a:rPr>
+                            <m:t>˙</m:t>
+                          </m:r>
+                        </m:lim>
+                      </m:limUpp>
+                      <m:r>
+                        <a:rPr lang="zh-CN" altLang="en-US">
+                          <a:latin typeface="Cambria Math" panose="02040503050406030204" pitchFamily="18" charset="0"/>
+                        </a:rPr>
+                        <m:t>=</m:t>
+                      </m:r>
+                      <m:r>
+                        <a:rPr lang="zh-CN" altLang="en-US" i="1">
+                          <a:latin typeface="Cambria Math" panose="02040503050406030204" pitchFamily="18" charset="0"/>
+                        </a:rPr>
+                        <m:t>𝜇</m:t>
+                      </m:r>
+                      <m:r>
+                        <a:rPr lang="en-US" altLang="zh-CN">
+                          <a:latin typeface="Cambria Math" panose="02040503050406030204" pitchFamily="18" charset="0"/>
+                        </a:rPr>
+                        <m:t>(</m:t>
+                      </m:r>
+                      <m:r>
+                        <a:rPr lang="en-US" altLang="zh-CN" i="1">
+                          <a:latin typeface="Cambria Math" panose="02040503050406030204" pitchFamily="18" charset="0"/>
+                        </a:rPr>
+                        <m:t>𝑥</m:t>
+                      </m:r>
+                      <m:r>
+                        <a:rPr lang="en-US" altLang="zh-CN" i="1">
+                          <a:latin typeface="Cambria Math" panose="02040503050406030204" pitchFamily="18" charset="0"/>
+                        </a:rPr>
+                        <m:t>−</m:t>
+                      </m:r>
+                      <m:sSup>
+                        <m:sSupPr>
+                          <m:ctrlPr>
+                            <a:rPr lang="en-US" altLang="zh-CN" i="1">
+                              <a:latin typeface="Cambria Math" panose="02040503050406030204" pitchFamily="18" charset="0"/>
+                            </a:rPr>
                           </m:ctrlPr>
-                        </m:mPr>
-                        <m:mr>
-                          <m:e>
-                            <m:d>
-                              <m:dPr>
-                                <m:begChr m:val=""/>
-                                <m:ctrlPr>
-                                  <a:rPr lang="zh-CN" altLang="en-US">
-                                    <a:latin typeface="Cambria Math" panose="02040503050406030204" pitchFamily="18" charset="0"/>
-                                  </a:rPr>
-                                </m:ctrlPr>
-                              </m:dPr>
-                              <m:e>
-                                <m:limUpp>
-                                  <m:limUppPr>
-                                    <m:ctrlPr>
-                                      <a:rPr lang="zh-CN" altLang="en-US">
-                                        <a:latin typeface="Cambria Math" panose="02040503050406030204" pitchFamily="18" charset="0"/>
-                                      </a:rPr>
-                                    </m:ctrlPr>
-                                  </m:limUppPr>
-                                  <m:e>
-                                    <m:r>
-                                      <a:rPr lang="zh-CN" altLang="en-US" i="1">
-                                        <a:latin typeface="Cambria Math" panose="02040503050406030204" pitchFamily="18" charset="0"/>
-                                      </a:rPr>
-                                      <m:t>𝑥</m:t>
-                                    </m:r>
-                                  </m:e>
-                                  <m:lim>
-                                    <m:r>
-                                      <a:rPr lang="zh-CN" altLang="en-US" i="0">
-                                        <a:latin typeface="Cambria Math" panose="02040503050406030204" pitchFamily="18" charset="0"/>
-                                      </a:rPr>
-                                      <m:t>˙</m:t>
-                                    </m:r>
-                                  </m:lim>
-                                </m:limUpp>
-                                <m:r>
-                                  <a:rPr lang="zh-CN" altLang="en-US" i="0">
-                                    <a:latin typeface="Cambria Math" panose="02040503050406030204" pitchFamily="18" charset="0"/>
-                                  </a:rPr>
-                                  <m:t>=</m:t>
-                                </m:r>
-                                <m:r>
-                                  <a:rPr lang="zh-CN" altLang="en-US" i="1">
-                                    <a:latin typeface="Cambria Math" panose="02040503050406030204" pitchFamily="18" charset="0"/>
-                                  </a:rPr>
-                                  <m:t>𝜇</m:t>
-                                </m:r>
-                                <m:r>
-                                  <m:rPr>
-                                    <m:sty m:val="p"/>
-                                  </m:rPr>
-                                  <a:rPr lang="zh-CN" altLang="en-US" i="0">
-                                    <a:latin typeface="Cambria Math" panose="02040503050406030204" pitchFamily="18" charset="0"/>
-                                  </a:rPr>
-                                  <m:t>si</m:t>
-                                </m:r>
-                                <m:func>
-                                  <m:funcPr>
-                                    <m:ctrlPr>
-                                      <a:rPr lang="zh-CN" altLang="en-US" i="1">
-                                        <a:latin typeface="Cambria Math" panose="02040503050406030204" pitchFamily="18" charset="0"/>
-                                      </a:rPr>
-                                    </m:ctrlPr>
-                                  </m:funcPr>
-                                  <m:fName>
-                                    <m:r>
-                                      <m:rPr>
-                                        <m:sty m:val="p"/>
-                                      </m:rPr>
-                                      <a:rPr lang="zh-CN" altLang="en-US" i="0">
-                                        <a:latin typeface="Cambria Math" panose="02040503050406030204" pitchFamily="18" charset="0"/>
-                                      </a:rPr>
-                                      <m:t>n</m:t>
-                                    </m:r>
-                                  </m:fName>
-                                  <m:e>
-                                    <m:r>
-                                      <a:rPr lang="zh-CN" altLang="en-US" i="0">
-                                        <a:latin typeface="Cambria Math" panose="02040503050406030204" pitchFamily="18" charset="0"/>
-                                      </a:rPr>
-                                      <m:t>(</m:t>
-                                    </m:r>
-                                  </m:e>
-                                </m:func>
-                                <m:r>
-                                  <a:rPr lang="zh-CN" altLang="en-US" i="1">
-                                    <a:latin typeface="Cambria Math" panose="02040503050406030204" pitchFamily="18" charset="0"/>
-                                  </a:rPr>
-                                  <m:t>𝜋</m:t>
-                                </m:r>
-                                <m:r>
-                                  <a:rPr lang="zh-CN" altLang="en-US" i="1">
-                                    <a:latin typeface="Cambria Math" panose="02040503050406030204" pitchFamily="18" charset="0"/>
-                                  </a:rPr>
-                                  <m:t>𝑥</m:t>
-                                </m:r>
-                              </m:e>
-                            </m:d>
-                          </m:e>
-                        </m:mr>
-                      </m:m>
+                        </m:sSupPr>
+                        <m:e>
+                          <m:r>
+                            <a:rPr lang="en-US" altLang="zh-CN" i="1">
+                              <a:latin typeface="Cambria Math" panose="02040503050406030204" pitchFamily="18" charset="0"/>
+                            </a:rPr>
+                            <m:t>𝑥</m:t>
+                          </m:r>
+                        </m:e>
+                        <m:sup>
+                          <m:r>
+                            <a:rPr lang="en-US" altLang="zh-CN" i="1">
+                              <a:latin typeface="Cambria Math" panose="02040503050406030204" pitchFamily="18" charset="0"/>
+                            </a:rPr>
+                            <m:t>2</m:t>
+                          </m:r>
+                        </m:sup>
+                      </m:sSup>
+                      <m:r>
+                        <a:rPr lang="en-US" altLang="zh-CN" i="1">
+                          <a:latin typeface="Cambria Math" panose="02040503050406030204" pitchFamily="18" charset="0"/>
+                        </a:rPr>
+                        <m:t>)</m:t>
+                      </m:r>
                     </m:oMath>
                   </m:oMathPara>
                 </a14:m>
@@ -10130,15 +10066,15 @@
             <p:spPr>
               <a:xfrm>
                 <a:off x="5085133" y="5725021"/>
-                <a:ext cx="1634294" cy="527580"/>
+                <a:ext cx="1637692" cy="454420"/>
               </a:xfrm>
               <a:prstGeom prst="rect">
                 <a:avLst/>
               </a:prstGeom>
               <a:blipFill>
-                <a:blip r:embed="rId3"/>
+                <a:blip r:embed="rId2"/>
                 <a:stretch>
-                  <a:fillRect t="-159524" r="-32308" b="-240476"/>
+                  <a:fillRect b="-10811"/>
                 </a:stretch>
               </a:blipFill>
             </p:spPr>
@@ -10157,6 +10093,36 @@
           </p:sp>
         </mc:Fallback>
       </mc:AlternateContent>
+      <p:pic>
+        <p:nvPicPr>
+          <p:cNvPr id="7" name="图片 6">
+            <a:extLst>
+              <a:ext uri="{FF2B5EF4-FFF2-40B4-BE49-F238E27FC236}">
+                <a16:creationId xmlns:a16="http://schemas.microsoft.com/office/drawing/2014/main" id="{9D97C1F7-CE98-5346-88A0-766CAFF9D21F}"/>
+              </a:ext>
+            </a:extLst>
+          </p:cNvPr>
+          <p:cNvPicPr>
+            <a:picLocks noChangeAspect="1"/>
+          </p:cNvPicPr>
+          <p:nvPr/>
+        </p:nvPicPr>
+        <p:blipFill>
+          <a:blip r:embed="rId3"/>
+          <a:stretch>
+            <a:fillRect/>
+          </a:stretch>
+        </p:blipFill>
+        <p:spPr>
+          <a:xfrm>
+            <a:off x="2904067" y="893377"/>
+            <a:ext cx="5732731" cy="4660757"/>
+          </a:xfrm>
+          <a:prstGeom prst="rect">
+            <a:avLst/>
+          </a:prstGeom>
+        </p:spPr>
+      </p:pic>
     </p:spTree>
     <p:extLst>
       <p:ext uri="{BB962C8B-B14F-4D97-AF65-F5344CB8AC3E}">

</xml_diff>